<commit_message>
Edited 50% of "Kinematics of miving frames"
</commit_message>
<xml_diff>
--- a/Springer_UAV_book/Pictures/Fig1.pptx
+++ b/Springer_UAV_book/Pictures/Fig1.pptx
@@ -290,7 +290,7 @@
             <a:fld id="{1D8BD707-D9CF-40AE-B4C6-C98DA3205C09}" type="datetimeFigureOut">
               <a:rPr lang="en-US" smtClean="0"/>
               <a:pPr/>
-              <a:t>4/9/2012</a:t>
+              <a:t>7/26/2012</a:t>
             </a:fld>
             <a:endParaRPr lang="en-US"/>
           </a:p>
@@ -457,7 +457,7 @@
             <a:fld id="{1D8BD707-D9CF-40AE-B4C6-C98DA3205C09}" type="datetimeFigureOut">
               <a:rPr lang="en-US" smtClean="0"/>
               <a:pPr/>
-              <a:t>4/9/2012</a:t>
+              <a:t>7/26/2012</a:t>
             </a:fld>
             <a:endParaRPr lang="en-US"/>
           </a:p>
@@ -634,7 +634,7 @@
             <a:fld id="{1D8BD707-D9CF-40AE-B4C6-C98DA3205C09}" type="datetimeFigureOut">
               <a:rPr lang="en-US" smtClean="0"/>
               <a:pPr/>
-              <a:t>4/9/2012</a:t>
+              <a:t>7/26/2012</a:t>
             </a:fld>
             <a:endParaRPr lang="en-US"/>
           </a:p>
@@ -801,7 +801,7 @@
             <a:fld id="{1D8BD707-D9CF-40AE-B4C6-C98DA3205C09}" type="datetimeFigureOut">
               <a:rPr lang="en-US" smtClean="0"/>
               <a:pPr/>
-              <a:t>4/9/2012</a:t>
+              <a:t>7/26/2012</a:t>
             </a:fld>
             <a:endParaRPr lang="en-US"/>
           </a:p>
@@ -1044,7 +1044,7 @@
             <a:fld id="{1D8BD707-D9CF-40AE-B4C6-C98DA3205C09}" type="datetimeFigureOut">
               <a:rPr lang="en-US" smtClean="0"/>
               <a:pPr/>
-              <a:t>4/9/2012</a:t>
+              <a:t>7/26/2012</a:t>
             </a:fld>
             <a:endParaRPr lang="en-US"/>
           </a:p>
@@ -1329,7 +1329,7 @@
             <a:fld id="{1D8BD707-D9CF-40AE-B4C6-C98DA3205C09}" type="datetimeFigureOut">
               <a:rPr lang="en-US" smtClean="0"/>
               <a:pPr/>
-              <a:t>4/9/2012</a:t>
+              <a:t>7/26/2012</a:t>
             </a:fld>
             <a:endParaRPr lang="en-US"/>
           </a:p>
@@ -1748,7 +1748,7 @@
             <a:fld id="{1D8BD707-D9CF-40AE-B4C6-C98DA3205C09}" type="datetimeFigureOut">
               <a:rPr lang="en-US" smtClean="0"/>
               <a:pPr/>
-              <a:t>4/9/2012</a:t>
+              <a:t>7/26/2012</a:t>
             </a:fld>
             <a:endParaRPr lang="en-US"/>
           </a:p>
@@ -1863,7 +1863,7 @@
             <a:fld id="{1D8BD707-D9CF-40AE-B4C6-C98DA3205C09}" type="datetimeFigureOut">
               <a:rPr lang="en-US" smtClean="0"/>
               <a:pPr/>
-              <a:t>4/9/2012</a:t>
+              <a:t>7/26/2012</a:t>
             </a:fld>
             <a:endParaRPr lang="en-US"/>
           </a:p>
@@ -1955,7 +1955,7 @@
             <a:fld id="{1D8BD707-D9CF-40AE-B4C6-C98DA3205C09}" type="datetimeFigureOut">
               <a:rPr lang="en-US" smtClean="0"/>
               <a:pPr/>
-              <a:t>4/9/2012</a:t>
+              <a:t>7/26/2012</a:t>
             </a:fld>
             <a:endParaRPr lang="en-US"/>
           </a:p>
@@ -2229,7 +2229,7 @@
             <a:fld id="{1D8BD707-D9CF-40AE-B4C6-C98DA3205C09}" type="datetimeFigureOut">
               <a:rPr lang="en-US" smtClean="0"/>
               <a:pPr/>
-              <a:t>4/9/2012</a:t>
+              <a:t>7/26/2012</a:t>
             </a:fld>
             <a:endParaRPr lang="en-US"/>
           </a:p>
@@ -2479,7 +2479,7 @@
             <a:fld id="{1D8BD707-D9CF-40AE-B4C6-C98DA3205C09}" type="datetimeFigureOut">
               <a:rPr lang="en-US" smtClean="0"/>
               <a:pPr/>
-              <a:t>4/9/2012</a:t>
+              <a:t>7/26/2012</a:t>
             </a:fld>
             <a:endParaRPr lang="en-US"/>
           </a:p>
@@ -2689,7 +2689,7 @@
             <a:fld id="{1D8BD707-D9CF-40AE-B4C6-C98DA3205C09}" type="datetimeFigureOut">
               <a:rPr lang="en-US" smtClean="0"/>
               <a:pPr/>
-              <a:t>4/9/2012</a:t>
+              <a:t>7/26/2012</a:t>
             </a:fld>
             <a:endParaRPr lang="en-US"/>
           </a:p>
@@ -3615,12 +3615,12 @@
             <p:nvPr/>
           </p:nvGraphicFramePr>
           <p:xfrm>
-            <a:off x="4837113" y="2319338"/>
-            <a:ext cx="152400" cy="165100"/>
+            <a:off x="4837113" y="2306638"/>
+            <a:ext cx="152400" cy="190500"/>
           </p:xfrm>
           <a:graphic>
             <a:graphicData uri="http://schemas.openxmlformats.org/presentationml/2006/ole">
-              <p:oleObj spid="_x0000_s1030" name="Equation" r:id="rId7" imgW="152280" imgH="164880" progId="Equation.DSMT4">
+              <p:oleObj spid="_x0000_s1030" name="Equation" r:id="rId7" imgW="152280" imgH="190440" progId="Equation.DSMT4">
                 <p:embed/>
               </p:oleObj>
             </a:graphicData>
@@ -4343,12 +4343,12 @@
                 <p:nvPr/>
               </p:nvGraphicFramePr>
               <p:xfrm>
-                <a:off x="4837113" y="2319338"/>
-                <a:ext cx="152400" cy="165100"/>
+                <a:off x="4837113" y="2306638"/>
+                <a:ext cx="152400" cy="190500"/>
               </p:xfrm>
               <a:graphic>
                 <a:graphicData uri="http://schemas.openxmlformats.org/presentationml/2006/ole">
-                  <p:oleObj spid="_x0000_s2054" name="Equation" r:id="rId7" imgW="152280" imgH="164880" progId="Equation.DSMT4">
+                  <p:oleObj spid="_x0000_s2054" name="Equation" r:id="rId7" imgW="152280" imgH="190440" progId="Equation.DSMT4">
                     <p:embed/>
                   </p:oleObj>
                 </a:graphicData>

</xml_diff>

<commit_message>
Complete review of the entire paper. Probably need to write a nomenclature.
</commit_message>
<xml_diff>
--- a/Springer_UAV_book/Pictures/Fig1.pptx
+++ b/Springer_UAV_book/Pictures/Fig1.pptx
@@ -290,7 +290,7 @@
             <a:fld id="{1D8BD707-D9CF-40AE-B4C6-C98DA3205C09}" type="datetimeFigureOut">
               <a:rPr lang="en-US" smtClean="0"/>
               <a:pPr/>
-              <a:t>7/26/2012</a:t>
+              <a:t>7/29/2012</a:t>
             </a:fld>
             <a:endParaRPr lang="en-US"/>
           </a:p>
@@ -457,7 +457,7 @@
             <a:fld id="{1D8BD707-D9CF-40AE-B4C6-C98DA3205C09}" type="datetimeFigureOut">
               <a:rPr lang="en-US" smtClean="0"/>
               <a:pPr/>
-              <a:t>7/26/2012</a:t>
+              <a:t>7/29/2012</a:t>
             </a:fld>
             <a:endParaRPr lang="en-US"/>
           </a:p>
@@ -634,7 +634,7 @@
             <a:fld id="{1D8BD707-D9CF-40AE-B4C6-C98DA3205C09}" type="datetimeFigureOut">
               <a:rPr lang="en-US" smtClean="0"/>
               <a:pPr/>
-              <a:t>7/26/2012</a:t>
+              <a:t>7/29/2012</a:t>
             </a:fld>
             <a:endParaRPr lang="en-US"/>
           </a:p>
@@ -801,7 +801,7 @@
             <a:fld id="{1D8BD707-D9CF-40AE-B4C6-C98DA3205C09}" type="datetimeFigureOut">
               <a:rPr lang="en-US" smtClean="0"/>
               <a:pPr/>
-              <a:t>7/26/2012</a:t>
+              <a:t>7/29/2012</a:t>
             </a:fld>
             <a:endParaRPr lang="en-US"/>
           </a:p>
@@ -1044,7 +1044,7 @@
             <a:fld id="{1D8BD707-D9CF-40AE-B4C6-C98DA3205C09}" type="datetimeFigureOut">
               <a:rPr lang="en-US" smtClean="0"/>
               <a:pPr/>
-              <a:t>7/26/2012</a:t>
+              <a:t>7/29/2012</a:t>
             </a:fld>
             <a:endParaRPr lang="en-US"/>
           </a:p>
@@ -1329,7 +1329,7 @@
             <a:fld id="{1D8BD707-D9CF-40AE-B4C6-C98DA3205C09}" type="datetimeFigureOut">
               <a:rPr lang="en-US" smtClean="0"/>
               <a:pPr/>
-              <a:t>7/26/2012</a:t>
+              <a:t>7/29/2012</a:t>
             </a:fld>
             <a:endParaRPr lang="en-US"/>
           </a:p>
@@ -1748,7 +1748,7 @@
             <a:fld id="{1D8BD707-D9CF-40AE-B4C6-C98DA3205C09}" type="datetimeFigureOut">
               <a:rPr lang="en-US" smtClean="0"/>
               <a:pPr/>
-              <a:t>7/26/2012</a:t>
+              <a:t>7/29/2012</a:t>
             </a:fld>
             <a:endParaRPr lang="en-US"/>
           </a:p>
@@ -1863,7 +1863,7 @@
             <a:fld id="{1D8BD707-D9CF-40AE-B4C6-C98DA3205C09}" type="datetimeFigureOut">
               <a:rPr lang="en-US" smtClean="0"/>
               <a:pPr/>
-              <a:t>7/26/2012</a:t>
+              <a:t>7/29/2012</a:t>
             </a:fld>
             <a:endParaRPr lang="en-US"/>
           </a:p>
@@ -1955,7 +1955,7 @@
             <a:fld id="{1D8BD707-D9CF-40AE-B4C6-C98DA3205C09}" type="datetimeFigureOut">
               <a:rPr lang="en-US" smtClean="0"/>
               <a:pPr/>
-              <a:t>7/26/2012</a:t>
+              <a:t>7/29/2012</a:t>
             </a:fld>
             <a:endParaRPr lang="en-US"/>
           </a:p>
@@ -2229,7 +2229,7 @@
             <a:fld id="{1D8BD707-D9CF-40AE-B4C6-C98DA3205C09}" type="datetimeFigureOut">
               <a:rPr lang="en-US" smtClean="0"/>
               <a:pPr/>
-              <a:t>7/26/2012</a:t>
+              <a:t>7/29/2012</a:t>
             </a:fld>
             <a:endParaRPr lang="en-US"/>
           </a:p>
@@ -2479,7 +2479,7 @@
             <a:fld id="{1D8BD707-D9CF-40AE-B4C6-C98DA3205C09}" type="datetimeFigureOut">
               <a:rPr lang="en-US" smtClean="0"/>
               <a:pPr/>
-              <a:t>7/26/2012</a:t>
+              <a:t>7/29/2012</a:t>
             </a:fld>
             <a:endParaRPr lang="en-US"/>
           </a:p>
@@ -2689,7 +2689,7 @@
             <a:fld id="{1D8BD707-D9CF-40AE-B4C6-C98DA3205C09}" type="datetimeFigureOut">
               <a:rPr lang="en-US" smtClean="0"/>
               <a:pPr/>
-              <a:t>7/26/2012</a:t>
+              <a:t>7/29/2012</a:t>
             </a:fld>
             <a:endParaRPr lang="en-US"/>
           </a:p>
@@ -3615,12 +3615,12 @@
             <p:nvPr/>
           </p:nvGraphicFramePr>
           <p:xfrm>
-            <a:off x="4837113" y="2306638"/>
-            <a:ext cx="152400" cy="190500"/>
+            <a:off x="4849813" y="2319338"/>
+            <a:ext cx="127000" cy="165100"/>
           </p:xfrm>
           <a:graphic>
             <a:graphicData uri="http://schemas.openxmlformats.org/presentationml/2006/ole">
-              <p:oleObj spid="_x0000_s1030" name="Equation" r:id="rId7" imgW="152280" imgH="190440" progId="Equation.DSMT4">
+              <p:oleObj spid="_x0000_s1030" name="Equation" r:id="rId7" imgW="126720" imgH="164880" progId="Equation.DSMT4">
                 <p:embed/>
               </p:oleObj>
             </a:graphicData>
@@ -3740,6 +3740,13 @@
   <p:clrMapOvr>
     <a:masterClrMapping/>
   </p:clrMapOvr>
+  <p:timing>
+    <p:tnLst>
+      <p:par>
+        <p:cTn id="1" dur="indefinite" restart="never" nodeType="tmRoot"/>
+      </p:par>
+    </p:tnLst>
+  </p:timing>
 </p:sld>
 </file>
 
@@ -4343,12 +4350,12 @@
                 <p:nvPr/>
               </p:nvGraphicFramePr>
               <p:xfrm>
-                <a:off x="4837113" y="2306638"/>
-                <a:ext cx="152400" cy="190500"/>
+                <a:off x="4849813" y="2319338"/>
+                <a:ext cx="127000" cy="165100"/>
               </p:xfrm>
               <a:graphic>
                 <a:graphicData uri="http://schemas.openxmlformats.org/presentationml/2006/ole">
-                  <p:oleObj spid="_x0000_s2054" name="Equation" r:id="rId7" imgW="152280" imgH="190440" progId="Equation.DSMT4">
+                  <p:oleObj spid="_x0000_s2054" name="Equation" r:id="rId7" imgW="126720" imgH="164880" progId="Equation.DSMT4">
                     <p:embed/>
                   </p:oleObj>
                 </a:graphicData>
@@ -4609,6 +4616,13 @@
   <p:clrMapOvr>
     <a:masterClrMapping/>
   </p:clrMapOvr>
+  <p:timing>
+    <p:tnLst>
+      <p:par>
+        <p:cTn id="1" dur="indefinite" restart="never" nodeType="tmRoot"/>
+      </p:par>
+    </p:tnLst>
+  </p:timing>
 </p:sld>
 </file>
 

</xml_diff>